<commit_message>
Added support for Angular
</commit_message>
<xml_diff>
--- a/node/lesson-55-networking-with-node/networking-with-node.pptx
+++ b/node/lesson-55-networking-with-node/networking-with-node.pptx
@@ -2986,6 +2986,13 @@
       <p:transition/>
     </mc:Fallback>
   </mc:AlternateContent>
+  <p:timing>
+    <p:tnLst>
+      <p:par>
+        <p:cTn xmlns:p14="http://schemas.microsoft.com/office/powerpoint/2010/main" id="1" dur="indefinite" restart="never" nodeType="tmRoot"/>
+      </p:par>
+    </p:tnLst>
+  </p:timing>
 </p:sld>
 </file>
 
@@ -3030,6 +3037,9 @@
             <a:pPr lvl="1"/>
             <a:r>
               <a:rPr lang="en-US" sz="1600" dirty="0" err="1">
+                <a:solidFill>
+                  <a:srgbClr val="FF0000"/>
+                </a:solidFill>
                 <a:latin typeface="Monaco"/>
                 <a:cs typeface="Monaco"/>
               </a:rPr>
@@ -3037,6 +3047,9 @@
             </a:r>
             <a:r>
               <a:rPr lang="en-US" sz="1600" dirty="0">
+                <a:solidFill>
+                  <a:srgbClr val="FF0000"/>
+                </a:solidFill>
                 <a:latin typeface="Monaco"/>
                 <a:cs typeface="Monaco"/>
               </a:rPr>
@@ -3175,6 +3188,13 @@
       <p:transition/>
     </mc:Fallback>
   </mc:AlternateContent>
+  <p:timing>
+    <p:tnLst>
+      <p:par>
+        <p:cTn xmlns:p14="http://schemas.microsoft.com/office/powerpoint/2010/main" id="1" dur="indefinite" restart="never" nodeType="tmRoot"/>
+      </p:par>
+    </p:tnLst>
+  </p:timing>
 </p:sld>
 </file>
 
@@ -3216,6 +3236,9 @@
             </a:r>
             <a:r>
               <a:rPr lang="en-US" sz="2000" dirty="0" err="1" smtClean="0">
+                <a:solidFill>
+                  <a:srgbClr val="FF0000"/>
+                </a:solidFill>
                 <a:latin typeface="Monaco"/>
                 <a:cs typeface="Monaco"/>
               </a:rPr>
@@ -3243,7 +3266,69 @@
                 <a:latin typeface="Monaco"/>
                 <a:cs typeface="Monaco"/>
               </a:rPr>
-              <a:t>'listening'</a:t>
+              <a:t>'</a:t>
+            </a:r>
+            <a:r>
+              <a:rPr lang="en-US" sz="1600" dirty="0" smtClean="0">
+                <a:solidFill>
+                  <a:srgbClr val="FF0000"/>
+                </a:solidFill>
+                <a:latin typeface="Monaco"/>
+                <a:cs typeface="Monaco"/>
+              </a:rPr>
+              <a:t>listen</a:t>
+            </a:r>
+            <a:r>
+              <a:rPr lang="en-US" sz="1600" dirty="0" smtClean="0">
+                <a:latin typeface="Monaco"/>
+                <a:cs typeface="Monaco"/>
+              </a:rPr>
+              <a:t>'</a:t>
+            </a:r>
+            <a:r>
+              <a:rPr lang="en-US" dirty="0" smtClean="0"/>
+              <a:t> </a:t>
+            </a:r>
+            <a:r>
+              <a:rPr lang="en-US" dirty="0" smtClean="0"/>
+              <a:t>event</a:t>
+            </a:r>
+          </a:p>
+          <a:p>
+            <a:r>
+              <a:rPr lang="en-US" dirty="0" smtClean="0"/>
+              <a:t>Converse with clients that connect</a:t>
+            </a:r>
+          </a:p>
+          <a:p>
+            <a:pPr lvl="1"/>
+            <a:r>
+              <a:rPr lang="en-US" dirty="0" smtClean="0"/>
+              <a:t>Notified when a client connects via a </a:t>
+            </a:r>
+            <a:r>
+              <a:rPr lang="en-US" sz="1600" dirty="0" smtClean="0">
+                <a:latin typeface="Monaco"/>
+                <a:cs typeface="Monaco"/>
+              </a:rPr>
+              <a:t>'</a:t>
+            </a:r>
+            <a:r>
+              <a:rPr lang="en-US" sz="1600" dirty="0" smtClean="0">
+                <a:solidFill>
+                  <a:srgbClr val="FF0000"/>
+                </a:solidFill>
+                <a:latin typeface="Monaco"/>
+                <a:cs typeface="Monaco"/>
+              </a:rPr>
+              <a:t>connect</a:t>
+            </a:r>
+            <a:r>
+              <a:rPr lang="en-US" sz="1600" dirty="0" smtClean="0">
+                <a:latin typeface="Monaco"/>
+                <a:cs typeface="Monaco"/>
+              </a:rPr>
+              <a:t>'</a:t>
             </a:r>
             <a:r>
               <a:rPr lang="en-US" dirty="0" smtClean="0"/>
@@ -3251,30 +3336,6 @@
             </a:r>
           </a:p>
           <a:p>
-            <a:r>
-              <a:rPr lang="en-US" dirty="0" smtClean="0"/>
-              <a:t>Converse with clients that connect</a:t>
-            </a:r>
-          </a:p>
-          <a:p>
-            <a:pPr lvl="1"/>
-            <a:r>
-              <a:rPr lang="en-US" dirty="0" smtClean="0"/>
-              <a:t>Notified when a client connects via a </a:t>
-            </a:r>
-            <a:r>
-              <a:rPr lang="en-US" sz="1600" dirty="0" smtClean="0">
-                <a:latin typeface="Monaco"/>
-                <a:cs typeface="Monaco"/>
-              </a:rPr>
-              <a:t>'connect'</a:t>
-            </a:r>
-            <a:r>
-              <a:rPr lang="en-US" dirty="0" smtClean="0"/>
-              <a:t> event</a:t>
-            </a:r>
-          </a:p>
-          <a:p>
             <a:pPr lvl="1"/>
             <a:r>
               <a:rPr lang="en-US" dirty="0" smtClean="0"/>
@@ -3282,6 +3343,9 @@
             </a:r>
             <a:r>
               <a:rPr lang="en-US" sz="1600" dirty="0" err="1">
+                <a:solidFill>
+                  <a:srgbClr val="FF0000"/>
+                </a:solidFill>
                 <a:latin typeface="Monaco"/>
                 <a:cs typeface="Monaco"/>
               </a:rPr>
@@ -3303,7 +3367,24 @@
                 <a:latin typeface="Monaco"/>
                 <a:cs typeface="Monaco"/>
               </a:rPr>
-              <a:t>'data'</a:t>
+              <a:t>'</a:t>
+            </a:r>
+            <a:r>
+              <a:rPr lang="en-US" sz="1600" dirty="0">
+                <a:solidFill>
+                  <a:srgbClr val="FF0000"/>
+                </a:solidFill>
+                <a:latin typeface="Monaco"/>
+                <a:cs typeface="Monaco"/>
+              </a:rPr>
+              <a:t>data</a:t>
+            </a:r>
+            <a:r>
+              <a:rPr lang="en-US" sz="1600" dirty="0">
+                <a:latin typeface="Monaco"/>
+                <a:cs typeface="Monaco"/>
+              </a:rPr>
+              <a:t>'</a:t>
             </a:r>
             <a:r>
               <a:rPr lang="en-US" dirty="0" smtClean="0"/>
@@ -3318,6 +3399,9 @@
             </a:r>
             <a:r>
               <a:rPr lang="en-US" sz="1600" dirty="0" err="1">
+                <a:solidFill>
+                  <a:srgbClr val="FF0000"/>
+                </a:solidFill>
                 <a:latin typeface="Monaco"/>
                 <a:cs typeface="Monaco"/>
               </a:rPr>
@@ -3340,6 +3424,9 @@
             </a:r>
             <a:r>
               <a:rPr lang="en-US" sz="1600" dirty="0" err="1">
+                <a:solidFill>
+                  <a:srgbClr val="FF0000"/>
+                </a:solidFill>
                 <a:latin typeface="Monaco"/>
                 <a:cs typeface="Monaco"/>
               </a:rPr>
@@ -3361,19 +3448,34 @@
                 <a:latin typeface="Monaco"/>
                 <a:cs typeface="Monaco"/>
               </a:rPr>
-              <a:t>'end'</a:t>
+              <a:t>'</a:t>
+            </a:r>
+            <a:r>
+              <a:rPr lang="en-US" sz="1600" dirty="0">
+                <a:solidFill>
+                  <a:srgbClr val="FF0000"/>
+                </a:solidFill>
+                <a:latin typeface="Monaco"/>
+                <a:cs typeface="Monaco"/>
+              </a:rPr>
+              <a:t>end</a:t>
+            </a:r>
+            <a:r>
+              <a:rPr lang="en-US" sz="1600" dirty="0">
+                <a:latin typeface="Monaco"/>
+                <a:cs typeface="Monaco"/>
+              </a:rPr>
+              <a:t>'</a:t>
             </a:r>
             <a:r>
               <a:rPr lang="en-US" dirty="0" smtClean="0"/>
-              <a:t> event emitted from socket</a:t>
-            </a:r>
-          </a:p>
-          <a:p>
-            <a:pPr lvl="1"/>
+              <a:t> event emitted from </a:t>
+            </a:r>
+            <a:r>
+              <a:rPr lang="en-US" dirty="0" smtClean="0"/>
+              <a:t>socket</a:t>
+            </a:r>
             <a:endParaRPr lang="en-US" dirty="0" smtClean="0"/>
-          </a:p>
-          <a:p>
-            <a:endParaRPr lang="en-US" dirty="0"/>
           </a:p>
         </p:txBody>
       </p:sp>
@@ -3568,7 +3670,7 @@
             <a:r>
               <a:rPr lang="en-US" sz="1600" dirty="0" err="1">
                 <a:solidFill>
-                  <a:srgbClr val="000000"/>
+                  <a:srgbClr val="FF0000"/>
                 </a:solidFill>
                 <a:latin typeface="Monaco"/>
                 <a:ea typeface="Monaco"/>
@@ -3579,13 +3681,24 @@
             <a:r>
               <a:rPr lang="en-US" sz="1600" dirty="0">
                 <a:solidFill>
-                  <a:srgbClr val="000000"/>
+                  <a:srgbClr val="FF0000"/>
                 </a:solidFill>
                 <a:latin typeface="Monaco"/>
                 <a:ea typeface="Monaco"/>
                 <a:cs typeface="Monaco"/>
               </a:rPr>
-              <a:t> server =</a:t>
+              <a:t> </a:t>
+            </a:r>
+            <a:r>
+              <a:rPr lang="en-US" sz="1600" dirty="0">
+                <a:solidFill>
+                  <a:srgbClr val="000000"/>
+                </a:solidFill>
+                <a:latin typeface="Monaco"/>
+                <a:ea typeface="Monaco"/>
+                <a:cs typeface="Monaco"/>
+              </a:rPr>
+              <a:t>server =</a:t>
             </a:r>
           </a:p>
           <a:p>
@@ -5083,7 +5196,11 @@
               <a:t>Use </a:t>
             </a:r>
             <a:r>
-              <a:rPr lang="en-US" dirty="0" err="1" smtClean="0"/>
+              <a:rPr lang="en-US" dirty="0" err="1" smtClean="0">
+                <a:solidFill>
+                  <a:srgbClr val="FF0000"/>
+                </a:solidFill>
+              </a:rPr>
               <a:t>net.connect</a:t>
             </a:r>
             <a:r>
@@ -5094,7 +5211,19 @@
           <a:p>
             <a:r>
               <a:rPr lang="en-US" dirty="0" smtClean="0"/>
-              <a:t>Once connected established, 'connect' event emitted</a:t>
+              <a:t>Once connected established, '</a:t>
+            </a:r>
+            <a:r>
+              <a:rPr lang="en-US" dirty="0" smtClean="0">
+                <a:solidFill>
+                  <a:srgbClr val="FF0000"/>
+                </a:solidFill>
+              </a:rPr>
+              <a:t>connect</a:t>
+            </a:r>
+            <a:r>
+              <a:rPr lang="en-US" dirty="0" smtClean="0"/>
+              <a:t>' event emitted</a:t>
             </a:r>
           </a:p>
           <a:p>
@@ -5104,10 +5233,18 @@
               <a:t>Given object of type </a:t>
             </a:r>
             <a:r>
-              <a:rPr lang="en-US" dirty="0" err="1" smtClean="0"/>
+              <a:rPr lang="en-US" dirty="0" err="1" smtClean="0">
+                <a:solidFill>
+                  <a:srgbClr val="FF0000"/>
+                </a:solidFill>
+              </a:rPr>
               <a:t>net.Socket</a:t>
             </a:r>
-            <a:endParaRPr lang="en-US" dirty="0" smtClean="0"/>
+            <a:endParaRPr lang="en-US" dirty="0" smtClean="0">
+              <a:solidFill>
+                <a:srgbClr val="FF0000"/>
+              </a:solidFill>
+            </a:endParaRPr>
           </a:p>
           <a:p>
             <a:pPr lvl="1"/>
@@ -7085,6 +7222,9 @@
             </a:r>
             <a:r>
               <a:rPr lang="en-US" sz="1800" dirty="0" smtClean="0">
+                <a:solidFill>
+                  <a:srgbClr val="FF0000"/>
+                </a:solidFill>
                 <a:latin typeface="Monaco"/>
                 <a:cs typeface="Monaco"/>
               </a:rPr>
@@ -7094,21 +7234,16 @@
           <a:p>
             <a:r>
               <a:rPr lang="en-US" sz="2000" dirty="0" smtClean="0"/>
-              <a:t>Creating servers with </a:t>
-            </a:r>
-            <a:r>
-              <a:rPr lang="en-US" sz="2000" smtClean="0"/>
-              <a:t>socket </a:t>
-            </a:r>
-            <a:r>
-              <a:rPr lang="en-US" sz="2000" smtClean="0"/>
-              <a:t>listeners</a:t>
+              <a:t>Creating servers with socket listeners</a:t>
             </a:r>
           </a:p>
           <a:p>
             <a:pPr lvl="1"/>
             <a:r>
-              <a:rPr lang="en-US" sz="1400" smtClean="0">
+              <a:rPr lang="en-US" sz="1400" dirty="0" err="1" smtClean="0">
+                <a:solidFill>
+                  <a:srgbClr val="FF0000"/>
+                </a:solidFill>
                 <a:latin typeface="Monaco"/>
                 <a:cs typeface="Monaco"/>
               </a:rPr>
@@ -7116,6 +7251,9 @@
             </a:r>
             <a:r>
               <a:rPr lang="en-US" sz="1400" dirty="0" smtClean="0">
+                <a:solidFill>
+                  <a:srgbClr val="FF0000"/>
+                </a:solidFill>
                 <a:latin typeface="Monaco"/>
                 <a:cs typeface="Monaco"/>
               </a:rPr>
@@ -7127,6 +7265,9 @@
             </a:r>
             <a:r>
               <a:rPr lang="en-US" sz="1400" dirty="0" smtClean="0">
+                <a:solidFill>
+                  <a:srgbClr val="FF0000"/>
+                </a:solidFill>
                 <a:latin typeface="Monaco"/>
                 <a:cs typeface="Monaco"/>
               </a:rPr>
@@ -7141,35 +7282,68 @@
                 <a:latin typeface="Monaco"/>
                 <a:cs typeface="Monaco"/>
               </a:rPr>
-              <a:t>'connection'</a:t>
+              <a:t>'</a:t>
+            </a:r>
+            <a:r>
+              <a:rPr lang="en-US" sz="1400" dirty="0" smtClean="0">
+                <a:solidFill>
+                  <a:srgbClr val="FF0000"/>
+                </a:solidFill>
+                <a:latin typeface="Monaco"/>
+                <a:cs typeface="Monaco"/>
+              </a:rPr>
+              <a:t>connect</a:t>
+            </a:r>
+            <a:r>
+              <a:rPr lang="en-US" sz="1400" dirty="0" smtClean="0">
+                <a:latin typeface="Monaco"/>
+                <a:cs typeface="Monaco"/>
+              </a:rPr>
+              <a:t>'</a:t>
             </a:r>
             <a:r>
               <a:rPr lang="en-US" sz="1600" dirty="0" smtClean="0"/>
-              <a:t> event</a:t>
+              <a:t> </a:t>
+            </a:r>
+            <a:r>
+              <a:rPr lang="en-US" sz="1600" dirty="0" smtClean="0"/>
+              <a:t>event</a:t>
             </a:r>
             <a:endParaRPr lang="en-US" sz="1600" dirty="0"/>
           </a:p>
           <a:p>
             <a:r>
               <a:rPr lang="en-US" sz="2000" dirty="0" smtClean="0"/>
-              <a:t>Creating socket </a:t>
-            </a:r>
-            <a:r>
-              <a:rPr lang="en-US" sz="2000" dirty="0" smtClean="0"/>
-              <a:t>clients</a:t>
+              <a:t>Creating socket clients</a:t>
             </a:r>
           </a:p>
           <a:p>
             <a:pPr lvl="1"/>
             <a:r>
+              <a:rPr lang="en-US" sz="1400" dirty="0" err="1">
+                <a:solidFill>
+                  <a:srgbClr val="FF0000"/>
+                </a:solidFill>
+                <a:latin typeface="Monaco"/>
+                <a:cs typeface="Monaco"/>
+              </a:rPr>
+              <a:t>n</a:t>
+            </a:r>
+            <a:r>
+              <a:rPr lang="en-US" sz="1400" dirty="0" err="1" smtClean="0">
+                <a:solidFill>
+                  <a:srgbClr val="FF0000"/>
+                </a:solidFill>
+                <a:latin typeface="Monaco"/>
+                <a:cs typeface="Monaco"/>
+              </a:rPr>
+              <a:t>et.connect</a:t>
+            </a:r>
+            <a:r>
               <a:rPr lang="en-US" sz="1400" dirty="0" smtClean="0">
-                <a:latin typeface="Monaco"/>
-                <a:cs typeface="Monaco"/>
-              </a:rPr>
-              <a:t>connect</a:t>
-            </a:r>
-            <a:r>
-              <a:rPr lang="en-US" sz="1400" dirty="0" smtClean="0">
+                <a:solidFill>
+                  <a:srgbClr val="FF0000"/>
+                </a:solidFill>
                 <a:latin typeface="Monaco"/>
                 <a:cs typeface="Monaco"/>
               </a:rPr>
@@ -7187,11 +7361,7 @@
             </a:r>
             <a:r>
               <a:rPr lang="en-US" sz="2000" dirty="0" smtClean="0"/>
-              <a:t>writing data over </a:t>
-            </a:r>
-            <a:r>
-              <a:rPr lang="en-US" sz="2000" dirty="0" smtClean="0"/>
-              <a:t>sockets</a:t>
+              <a:t>writing data over sockets</a:t>
             </a:r>
           </a:p>
           <a:p>
@@ -7235,11 +7405,7 @@
           <a:p>
             <a:r>
               <a:rPr lang="en-US" sz="2000" dirty="0" smtClean="0"/>
-              <a:t>Duplex </a:t>
-            </a:r>
-            <a:r>
-              <a:rPr lang="en-US" sz="2000" dirty="0" smtClean="0"/>
-              <a:t>streams</a:t>
+              <a:t>Duplex streams</a:t>
             </a:r>
           </a:p>
           <a:p>
@@ -7350,6 +7516,13 @@
       <p:transition/>
     </mc:Fallback>
   </mc:AlternateContent>
+  <p:timing>
+    <p:tnLst>
+      <p:par>
+        <p:cTn xmlns:p14="http://schemas.microsoft.com/office/powerpoint/2010/main" id="1" dur="indefinite" restart="never" nodeType="tmRoot"/>
+      </p:par>
+    </p:tnLst>
+  </p:timing>
 </p:sld>
 </file>
 

</xml_diff>